<commit_message>
Update API & Web Services Testing Training Postman.pptx
</commit_message>
<xml_diff>
--- a/API & Web Services Testing Training Postman.pptx
+++ b/API & Web Services Testing Training Postman.pptx
@@ -4182,18 +4182,10 @@
             </a:pPr>
             <a:r>
               <a:rPr lang="en-US" dirty="0" smtClean="0"/>
-              <a:t>Please refer document Parameters </a:t>
-            </a:r>
-            <a:r>
-              <a:rPr lang="en-US" smtClean="0"/>
-              <a:t>in </a:t>
-            </a:r>
-            <a:r>
-              <a:rPr lang="en-US" smtClean="0"/>
-              <a:t>Monitor Collections.docx</a:t>
-            </a:r>
-            <a:r>
-              <a:rPr lang="en-US" smtClean="0"/>
+              <a:t>Please refer document Parameters in Monitor Collections.docx</a:t>
+            </a:r>
+            <a:r>
+              <a:rPr lang="en-US" dirty="0" smtClean="0"/>
               <a:t> </a:t>
             </a:r>
             <a:r>

</xml_diff>